<commit_message>
docs: Provide "Using Kubernetes Event Grid Bridge with Opsgenie's Kubernetes Event Exporter" walkthrough (#95)
</commit_message>
<xml_diff>
--- a/media/schematics.pptx
+++ b/media/schematics.pptx
@@ -8,6 +8,7 @@
     <p:sldId id="257" r:id="rId2"/>
     <p:sldId id="260" r:id="rId3"/>
     <p:sldId id="261" r:id="rId4"/>
+    <p:sldId id="262" r:id="rId5"/>
   </p:sldIdLst>
   <p:sldSz cx="12192000" cy="6858000"/>
   <p:notesSz cx="6858000" cy="9144000"/>
@@ -263,7 +264,7 @@
           <a:p>
             <a:fld id="{60B4198D-9617-4566-8955-28E414FE487B}" type="datetimeFigureOut">
               <a:rPr lang="LID4096" smtClean="0"/>
-              <a:t>01/14/2021</a:t>
+              <a:t>01/15/2021</a:t>
             </a:fld>
             <a:endParaRPr lang="LID4096"/>
           </a:p>
@@ -463,7 +464,7 @@
           <a:p>
             <a:fld id="{60B4198D-9617-4566-8955-28E414FE487B}" type="datetimeFigureOut">
               <a:rPr lang="LID4096" smtClean="0"/>
-              <a:t>01/14/2021</a:t>
+              <a:t>01/15/2021</a:t>
             </a:fld>
             <a:endParaRPr lang="LID4096"/>
           </a:p>
@@ -673,7 +674,7 @@
           <a:p>
             <a:fld id="{60B4198D-9617-4566-8955-28E414FE487B}" type="datetimeFigureOut">
               <a:rPr lang="LID4096" smtClean="0"/>
-              <a:t>01/14/2021</a:t>
+              <a:t>01/15/2021</a:t>
             </a:fld>
             <a:endParaRPr lang="LID4096"/>
           </a:p>
@@ -873,7 +874,7 @@
           <a:p>
             <a:fld id="{60B4198D-9617-4566-8955-28E414FE487B}" type="datetimeFigureOut">
               <a:rPr lang="LID4096" smtClean="0"/>
-              <a:t>01/14/2021</a:t>
+              <a:t>01/15/2021</a:t>
             </a:fld>
             <a:endParaRPr lang="LID4096"/>
           </a:p>
@@ -1149,7 +1150,7 @@
           <a:p>
             <a:fld id="{60B4198D-9617-4566-8955-28E414FE487B}" type="datetimeFigureOut">
               <a:rPr lang="LID4096" smtClean="0"/>
-              <a:t>01/14/2021</a:t>
+              <a:t>01/15/2021</a:t>
             </a:fld>
             <a:endParaRPr lang="LID4096"/>
           </a:p>
@@ -1417,7 +1418,7 @@
           <a:p>
             <a:fld id="{60B4198D-9617-4566-8955-28E414FE487B}" type="datetimeFigureOut">
               <a:rPr lang="LID4096" smtClean="0"/>
-              <a:t>01/14/2021</a:t>
+              <a:t>01/15/2021</a:t>
             </a:fld>
             <a:endParaRPr lang="LID4096"/>
           </a:p>
@@ -1832,7 +1833,7 @@
           <a:p>
             <a:fld id="{60B4198D-9617-4566-8955-28E414FE487B}" type="datetimeFigureOut">
               <a:rPr lang="LID4096" smtClean="0"/>
-              <a:t>01/14/2021</a:t>
+              <a:t>01/15/2021</a:t>
             </a:fld>
             <a:endParaRPr lang="LID4096"/>
           </a:p>
@@ -1974,7 +1975,7 @@
           <a:p>
             <a:fld id="{60B4198D-9617-4566-8955-28E414FE487B}" type="datetimeFigureOut">
               <a:rPr lang="LID4096" smtClean="0"/>
-              <a:t>01/14/2021</a:t>
+              <a:t>01/15/2021</a:t>
             </a:fld>
             <a:endParaRPr lang="LID4096"/>
           </a:p>
@@ -2087,7 +2088,7 @@
           <a:p>
             <a:fld id="{60B4198D-9617-4566-8955-28E414FE487B}" type="datetimeFigureOut">
               <a:rPr lang="LID4096" smtClean="0"/>
-              <a:t>01/14/2021</a:t>
+              <a:t>01/15/2021</a:t>
             </a:fld>
             <a:endParaRPr lang="LID4096"/>
           </a:p>
@@ -2400,7 +2401,7 @@
           <a:p>
             <a:fld id="{60B4198D-9617-4566-8955-28E414FE487B}" type="datetimeFigureOut">
               <a:rPr lang="LID4096" smtClean="0"/>
-              <a:t>01/14/2021</a:t>
+              <a:t>01/15/2021</a:t>
             </a:fld>
             <a:endParaRPr lang="LID4096"/>
           </a:p>
@@ -2689,7 +2690,7 @@
           <a:p>
             <a:fld id="{60B4198D-9617-4566-8955-28E414FE487B}" type="datetimeFigureOut">
               <a:rPr lang="LID4096" smtClean="0"/>
-              <a:t>01/14/2021</a:t>
+              <a:t>01/15/2021</a:t>
             </a:fld>
             <a:endParaRPr lang="LID4096"/>
           </a:p>
@@ -2932,7 +2933,7 @@
           <a:p>
             <a:fld id="{60B4198D-9617-4566-8955-28E414FE487B}" type="datetimeFigureOut">
               <a:rPr lang="LID4096" smtClean="0"/>
-              <a:t>01/14/2021</a:t>
+              <a:t>01/15/2021</a:t>
             </a:fld>
             <a:endParaRPr lang="LID4096"/>
           </a:p>
@@ -7109,7 +7110,7 @@
         <p:spPr>
           <a:xfrm>
             <a:off x="616597" y="679687"/>
-            <a:ext cx="11029063" cy="1798885"/>
+            <a:ext cx="7165327" cy="1798885"/>
           </a:xfrm>
           <a:prstGeom prst="rect">
             <a:avLst/>
@@ -8175,6 +8176,1587 @@
           </p:spPr>
         </p:pic>
       </p:grpSp>
+      <p:grpSp>
+        <p:nvGrpSpPr>
+          <p:cNvPr id="19" name="Group 18">
+            <a:extLst>
+              <a:ext uri="{FF2B5EF4-FFF2-40B4-BE49-F238E27FC236}">
+                <a16:creationId xmlns:a16="http://schemas.microsoft.com/office/drawing/2014/main" id="{622772B0-002D-46EA-A960-39A2C2D8AE8D}"/>
+              </a:ext>
+            </a:extLst>
+          </p:cNvPr>
+          <p:cNvGrpSpPr/>
+          <p:nvPr/>
+        </p:nvGrpSpPr>
+        <p:grpSpPr>
+          <a:xfrm>
+            <a:off x="1124341" y="911710"/>
+            <a:ext cx="1506455" cy="1177886"/>
+            <a:chOff x="9014546" y="911710"/>
+            <a:chExt cx="1506455" cy="1177886"/>
+          </a:xfrm>
+        </p:grpSpPr>
+        <p:pic>
+          <p:nvPicPr>
+            <p:cNvPr id="17" name="Picture 16">
+              <a:extLst>
+                <a:ext uri="{FF2B5EF4-FFF2-40B4-BE49-F238E27FC236}">
+                  <a16:creationId xmlns:a16="http://schemas.microsoft.com/office/drawing/2014/main" id="{F4F5A1E6-7846-4D06-A1BD-E5EE7534D3C5}"/>
+                </a:ext>
+              </a:extLst>
+            </p:cNvPr>
+            <p:cNvPicPr>
+              <a:picLocks noChangeAspect="1"/>
+            </p:cNvPicPr>
+            <p:nvPr/>
+          </p:nvPicPr>
+          <p:blipFill>
+            <a:blip r:embed="rId9"/>
+            <a:stretch>
+              <a:fillRect/>
+            </a:stretch>
+          </p:blipFill>
+          <p:spPr>
+            <a:xfrm>
+              <a:off x="9215046" y="911710"/>
+              <a:ext cx="1105453" cy="860243"/>
+            </a:xfrm>
+            <a:prstGeom prst="rect">
+              <a:avLst/>
+            </a:prstGeom>
+          </p:spPr>
+        </p:pic>
+        <p:sp>
+          <p:nvSpPr>
+            <p:cNvPr id="41" name="TextBox 40">
+              <a:extLst>
+                <a:ext uri="{FF2B5EF4-FFF2-40B4-BE49-F238E27FC236}">
+                  <a16:creationId xmlns:a16="http://schemas.microsoft.com/office/drawing/2014/main" id="{A7D70BE6-EB86-46D6-A18A-FC7A423F40F9}"/>
+                </a:ext>
+              </a:extLst>
+            </p:cNvPr>
+            <p:cNvSpPr txBox="1"/>
+            <p:nvPr/>
+          </p:nvSpPr>
+          <p:spPr>
+            <a:xfrm>
+              <a:off x="9014546" y="1812597"/>
+              <a:ext cx="1506455" cy="276999"/>
+            </a:xfrm>
+            <a:prstGeom prst="rect">
+              <a:avLst/>
+            </a:prstGeom>
+            <a:noFill/>
+          </p:spPr>
+          <p:txBody>
+            <a:bodyPr wrap="square" rtlCol="0">
+              <a:spAutoFit/>
+            </a:bodyPr>
+            <a:lstStyle/>
+            <a:p>
+              <a:pPr algn="ctr"/>
+              <a:r>
+                <a:rPr lang="en-US" sz="1200" dirty="0">
+                  <a:latin typeface="Segoe UI Light" panose="020B0502040204020203" pitchFamily="34" charset="0"/>
+                  <a:cs typeface="Segoe UI Light" panose="020B0502040204020203" pitchFamily="34" charset="0"/>
+                </a:rPr>
+                <a:t>Azure Logic Apps</a:t>
+              </a:r>
+              <a:endParaRPr lang="LID4096" sz="1200" dirty="0">
+                <a:latin typeface="Segoe UI Light" panose="020B0502040204020203" pitchFamily="34" charset="0"/>
+                <a:cs typeface="Segoe UI Light" panose="020B0502040204020203" pitchFamily="34" charset="0"/>
+              </a:endParaRPr>
+            </a:p>
+          </p:txBody>
+        </p:sp>
+      </p:grpSp>
+      <p:cxnSp>
+        <p:nvCxnSpPr>
+          <p:cNvPr id="46" name="Connector: Elbow 27">
+            <a:extLst>
+              <a:ext uri="{FF2B5EF4-FFF2-40B4-BE49-F238E27FC236}">
+                <a16:creationId xmlns:a16="http://schemas.microsoft.com/office/drawing/2014/main" id="{2427F745-11DD-400C-A13F-AD0BD4DC452B}"/>
+              </a:ext>
+            </a:extLst>
+          </p:cNvPr>
+          <p:cNvCxnSpPr>
+            <a:cxnSpLocks/>
+            <a:stCxn id="9" idx="1"/>
+            <a:endCxn id="17" idx="3"/>
+          </p:cNvCxnSpPr>
+          <p:nvPr/>
+        </p:nvCxnSpPr>
+        <p:spPr>
+          <a:xfrm flipH="1" flipV="1">
+            <a:off x="2430294" y="1341832"/>
+            <a:ext cx="3407745" cy="1320"/>
+          </a:xfrm>
+          <a:prstGeom prst="straightConnector1">
+            <a:avLst/>
+          </a:prstGeom>
+          <a:ln w="12700">
+            <a:tailEnd type="triangle"/>
+          </a:ln>
+        </p:spPr>
+        <p:style>
+          <a:lnRef idx="1">
+            <a:schemeClr val="accent6"/>
+          </a:lnRef>
+          <a:fillRef idx="0">
+            <a:schemeClr val="accent6"/>
+          </a:fillRef>
+          <a:effectRef idx="0">
+            <a:schemeClr val="accent6"/>
+          </a:effectRef>
+          <a:fontRef idx="minor">
+            <a:schemeClr val="tx1"/>
+          </a:fontRef>
+        </p:style>
+      </p:cxnSp>
+    </p:spTree>
+    <p:extLst>
+      <p:ext uri="{BB962C8B-B14F-4D97-AF65-F5344CB8AC3E}">
+        <p14:creationId xmlns:p14="http://schemas.microsoft.com/office/powerpoint/2010/main" val="2013672162"/>
+      </p:ext>
+    </p:extLst>
+  </p:cSld>
+  <p:clrMapOvr>
+    <a:masterClrMapping/>
+  </p:clrMapOvr>
+</p:sld>
+</file>
+
+<file path=ppt/slides/slide4.xml><?xml version="1.0" encoding="utf-8"?>
+<p:sld xmlns:a="http://schemas.openxmlformats.org/drawingml/2006/main" xmlns:r="http://schemas.openxmlformats.org/officeDocument/2006/relationships" xmlns:p="http://schemas.openxmlformats.org/presentationml/2006/main">
+  <p:cSld>
+    <p:spTree>
+      <p:nvGrpSpPr>
+        <p:cNvPr id="1" name=""/>
+        <p:cNvGrpSpPr/>
+        <p:nvPr/>
+      </p:nvGrpSpPr>
+      <p:grpSpPr>
+        <a:xfrm>
+          <a:off x="0" y="0"/>
+          <a:ext cx="0" cy="0"/>
+          <a:chOff x="0" y="0"/>
+          <a:chExt cx="0" cy="0"/>
+        </a:xfrm>
+      </p:grpSpPr>
+      <p:sp>
+        <p:nvSpPr>
+          <p:cNvPr id="30" name="Rectangle 29">
+            <a:extLst>
+              <a:ext uri="{FF2B5EF4-FFF2-40B4-BE49-F238E27FC236}">
+                <a16:creationId xmlns:a16="http://schemas.microsoft.com/office/drawing/2014/main" id="{522BD0C0-478F-4F61-A8FC-E9609A25FC71}"/>
+              </a:ext>
+            </a:extLst>
+          </p:cNvPr>
+          <p:cNvSpPr/>
+          <p:nvPr/>
+        </p:nvSpPr>
+        <p:spPr>
+          <a:xfrm>
+            <a:off x="616597" y="3580964"/>
+            <a:ext cx="7165327" cy="3087255"/>
+          </a:xfrm>
+          <a:prstGeom prst="rect">
+            <a:avLst/>
+          </a:prstGeom>
+          <a:solidFill>
+            <a:schemeClr val="accent5">
+              <a:lumMod val="20000"/>
+              <a:lumOff val="80000"/>
+            </a:schemeClr>
+          </a:solidFill>
+          <a:ln w="25400" cap="flat" cmpd="sng" algn="ctr">
+            <a:solidFill>
+              <a:srgbClr val="0070C0"/>
+            </a:solidFill>
+            <a:prstDash val="solid"/>
+          </a:ln>
+          <a:effectLst/>
+        </p:spPr>
+        <p:txBody>
+          <a:bodyPr rtlCol="0" anchor="ctr"/>
+          <a:lstStyle/>
+          <a:p>
+            <a:pPr marL="0" marR="0" lvl="0" indent="0" algn="ctr" defTabSz="914400" eaLnBrk="1" fontAlgn="auto" latinLnBrk="0" hangingPunct="1">
+              <a:lnSpc>
+                <a:spcPct val="100000"/>
+              </a:lnSpc>
+              <a:spcBef>
+                <a:spcPts val="0"/>
+              </a:spcBef>
+              <a:spcAft>
+                <a:spcPts val="0"/>
+              </a:spcAft>
+              <a:buClrTx/>
+              <a:buSzTx/>
+              <a:buFontTx/>
+              <a:buNone/>
+              <a:tabLst/>
+              <a:defRPr/>
+            </a:pPr>
+            <a:endParaRPr kumimoji="0" lang="en-BE" sz="1800" b="0" i="0" u="none" strike="noStrike" kern="0" cap="none" spc="0" normalizeH="0" baseline="0" noProof="0" dirty="0" err="1">
+              <a:ln>
+                <a:noFill/>
+              </a:ln>
+              <a:solidFill>
+                <a:srgbClr val="FFFFFF"/>
+              </a:solidFill>
+              <a:effectLst/>
+              <a:uLnTx/>
+              <a:uFillTx/>
+              <a:latin typeface="Tahoma"/>
+              <a:ea typeface="+mn-ea"/>
+              <a:cs typeface="Tahoma"/>
+            </a:endParaRPr>
+          </a:p>
+        </p:txBody>
+      </p:sp>
+      <p:pic>
+        <p:nvPicPr>
+          <p:cNvPr id="37" name="Picture 2" descr="Image result for kubernetes logo">
+            <a:extLst>
+              <a:ext uri="{FF2B5EF4-FFF2-40B4-BE49-F238E27FC236}">
+                <a16:creationId xmlns:a16="http://schemas.microsoft.com/office/drawing/2014/main" id="{58AD8788-EE45-4C80-8FEF-47C051EB92F6}"/>
+              </a:ext>
+            </a:extLst>
+          </p:cNvPr>
+          <p:cNvPicPr>
+            <a:picLocks noChangeAspect="1" noChangeArrowheads="1"/>
+          </p:cNvPicPr>
+          <p:nvPr/>
+        </p:nvPicPr>
+        <p:blipFill>
+          <a:blip r:embed="rId2" cstate="print">
+            <a:extLst>
+              <a:ext uri="{28A0092B-C50C-407E-A947-70E740481C1C}">
+                <a14:useLocalDpi xmlns:a14="http://schemas.microsoft.com/office/drawing/2010/main" val="0"/>
+              </a:ext>
+            </a:extLst>
+          </a:blip>
+          <a:srcRect/>
+          <a:stretch>
+            <a:fillRect/>
+          </a:stretch>
+        </p:blipFill>
+        <p:spPr bwMode="auto">
+          <a:xfrm>
+            <a:off x="616597" y="2940256"/>
+            <a:ext cx="2470033" cy="519837"/>
+          </a:xfrm>
+          <a:prstGeom prst="rect">
+            <a:avLst/>
+          </a:prstGeom>
+          <a:noFill/>
+          <a:extLst>
+            <a:ext uri="{909E8E84-426E-40DD-AFC4-6F175D3DCCD1}">
+              <a14:hiddenFill xmlns:a14="http://schemas.microsoft.com/office/drawing/2010/main">
+                <a:solidFill>
+                  <a:srgbClr val="FFFFFF"/>
+                </a:solidFill>
+              </a14:hiddenFill>
+            </a:ext>
+          </a:extLst>
+        </p:spPr>
+      </p:pic>
+      <p:grpSp>
+        <p:nvGrpSpPr>
+          <p:cNvPr id="15" name="Group 14">
+            <a:extLst>
+              <a:ext uri="{FF2B5EF4-FFF2-40B4-BE49-F238E27FC236}">
+                <a16:creationId xmlns:a16="http://schemas.microsoft.com/office/drawing/2014/main" id="{05C967FB-CB11-4F86-8586-DB8FE927B63B}"/>
+              </a:ext>
+            </a:extLst>
+          </p:cNvPr>
+          <p:cNvGrpSpPr/>
+          <p:nvPr/>
+        </p:nvGrpSpPr>
+        <p:grpSpPr>
+          <a:xfrm>
+            <a:off x="5406911" y="4188513"/>
+            <a:ext cx="1730768" cy="2134648"/>
+            <a:chOff x="5406911" y="4188513"/>
+            <a:chExt cx="1730768" cy="2134648"/>
+          </a:xfrm>
+        </p:grpSpPr>
+        <p:grpSp>
+          <p:nvGrpSpPr>
+            <p:cNvPr id="3" name="Group 2">
+              <a:extLst>
+                <a:ext uri="{FF2B5EF4-FFF2-40B4-BE49-F238E27FC236}">
+                  <a16:creationId xmlns:a16="http://schemas.microsoft.com/office/drawing/2014/main" id="{EBF5AA3A-1B1B-49D3-B04A-B74A389E3746}"/>
+                </a:ext>
+              </a:extLst>
+            </p:cNvPr>
+            <p:cNvGrpSpPr/>
+            <p:nvPr/>
+          </p:nvGrpSpPr>
+          <p:grpSpPr>
+            <a:xfrm>
+              <a:off x="5406911" y="4188513"/>
+              <a:ext cx="1730768" cy="2134648"/>
+              <a:chOff x="5406911" y="4188513"/>
+              <a:chExt cx="1730768" cy="2134648"/>
+            </a:xfrm>
+          </p:grpSpPr>
+          <p:sp>
+            <p:nvSpPr>
+              <p:cNvPr id="29" name="Rectangle 28">
+                <a:extLst>
+                  <a:ext uri="{FF2B5EF4-FFF2-40B4-BE49-F238E27FC236}">
+                    <a16:creationId xmlns:a16="http://schemas.microsoft.com/office/drawing/2014/main" id="{BB536FB3-834D-4E1C-8DCA-6B20DB6930AA}"/>
+                  </a:ext>
+                </a:extLst>
+              </p:cNvPr>
+              <p:cNvSpPr/>
+              <p:nvPr/>
+            </p:nvSpPr>
+            <p:spPr>
+              <a:xfrm>
+                <a:off x="5406911" y="4188513"/>
+                <a:ext cx="1730768" cy="2134648"/>
+              </a:xfrm>
+              <a:prstGeom prst="rect">
+                <a:avLst/>
+              </a:prstGeom>
+              <a:solidFill>
+                <a:srgbClr val="FFFFFF"/>
+              </a:solidFill>
+              <a:ln w="19050" cap="flat" cmpd="sng" algn="ctr">
+                <a:solidFill>
+                  <a:schemeClr val="tx1"/>
+                </a:solidFill>
+                <a:prstDash val="solid"/>
+              </a:ln>
+              <a:effectLst/>
+            </p:spPr>
+            <p:txBody>
+              <a:bodyPr rtlCol="0" anchor="ctr"/>
+              <a:lstStyle/>
+              <a:p>
+                <a:pPr marL="0" marR="0" lvl="0" indent="0" algn="ctr" defTabSz="914400" eaLnBrk="1" fontAlgn="auto" latinLnBrk="0" hangingPunct="1">
+                  <a:lnSpc>
+                    <a:spcPct val="100000"/>
+                  </a:lnSpc>
+                  <a:spcBef>
+                    <a:spcPts val="0"/>
+                  </a:spcBef>
+                  <a:spcAft>
+                    <a:spcPts val="0"/>
+                  </a:spcAft>
+                  <a:buClrTx/>
+                  <a:buSzTx/>
+                  <a:buFontTx/>
+                  <a:buNone/>
+                  <a:tabLst/>
+                  <a:defRPr/>
+                </a:pPr>
+                <a:endParaRPr kumimoji="0" lang="en-BE" sz="1800" b="0" i="0" u="none" strike="noStrike" kern="0" cap="none" spc="0" normalizeH="0" baseline="0" noProof="0" dirty="0" err="1">
+                  <a:ln>
+                    <a:noFill/>
+                  </a:ln>
+                  <a:solidFill>
+                    <a:srgbClr val="FFFFFF"/>
+                  </a:solidFill>
+                  <a:effectLst/>
+                  <a:uLnTx/>
+                  <a:uFillTx/>
+                  <a:latin typeface="Tahoma"/>
+                  <a:ea typeface="+mn-ea"/>
+                  <a:cs typeface="Tahoma"/>
+                </a:endParaRPr>
+              </a:p>
+            </p:txBody>
+          </p:sp>
+          <p:pic>
+            <p:nvPicPr>
+              <p:cNvPr id="5" name="Picture 4" descr="Icon&#10;&#10;Description automatically generated">
+                <a:extLst>
+                  <a:ext uri="{FF2B5EF4-FFF2-40B4-BE49-F238E27FC236}">
+                    <a16:creationId xmlns:a16="http://schemas.microsoft.com/office/drawing/2014/main" id="{68D0EA61-909E-4BC5-A3A0-90FBCB7FBDFD}"/>
+                  </a:ext>
+                </a:extLst>
+              </p:cNvPr>
+              <p:cNvPicPr>
+                <a:picLocks noChangeAspect="1"/>
+              </p:cNvPicPr>
+              <p:nvPr/>
+            </p:nvPicPr>
+            <p:blipFill rotWithShape="1">
+              <a:blip r:embed="rId3">
+                <a:extLst>
+                  <a:ext uri="{28A0092B-C50C-407E-A947-70E740481C1C}">
+                    <a14:useLocalDpi xmlns:a14="http://schemas.microsoft.com/office/drawing/2010/main" val="0"/>
+                  </a:ext>
+                </a:extLst>
+              </a:blip>
+              <a:srcRect l="2990" t="4067" r="3987" b="3735"/>
+              <a:stretch/>
+            </p:blipFill>
+            <p:spPr>
+              <a:xfrm>
+                <a:off x="5727932" y="4348059"/>
+                <a:ext cx="1088726" cy="1051432"/>
+              </a:xfrm>
+              <a:prstGeom prst="rect">
+                <a:avLst/>
+              </a:prstGeom>
+            </p:spPr>
+          </p:pic>
+        </p:grpSp>
+        <p:sp>
+          <p:nvSpPr>
+            <p:cNvPr id="6" name="TextBox 5">
+              <a:extLst>
+                <a:ext uri="{FF2B5EF4-FFF2-40B4-BE49-F238E27FC236}">
+                  <a16:creationId xmlns:a16="http://schemas.microsoft.com/office/drawing/2014/main" id="{DD6A15F7-0522-4776-9662-4E0D93F5E5D6}"/>
+                </a:ext>
+              </a:extLst>
+            </p:cNvPr>
+            <p:cNvSpPr txBox="1"/>
+            <p:nvPr/>
+          </p:nvSpPr>
+          <p:spPr>
+            <a:xfrm>
+              <a:off x="5406911" y="5645450"/>
+              <a:ext cx="1730768" cy="523220"/>
+            </a:xfrm>
+            <a:prstGeom prst="rect">
+              <a:avLst/>
+            </a:prstGeom>
+            <a:noFill/>
+          </p:spPr>
+          <p:txBody>
+            <a:bodyPr wrap="square" rtlCol="0">
+              <a:spAutoFit/>
+            </a:bodyPr>
+            <a:lstStyle/>
+            <a:p>
+              <a:pPr algn="ctr"/>
+              <a:r>
+                <a:rPr lang="en-US" sz="1400" dirty="0">
+                  <a:solidFill>
+                    <a:srgbClr val="0072C9"/>
+                  </a:solidFill>
+                  <a:latin typeface="Segoe UI Semibold" panose="020B0702040204020203" pitchFamily="34" charset="0"/>
+                  <a:cs typeface="Segoe UI Semibold" panose="020B0702040204020203" pitchFamily="34" charset="0"/>
+                </a:rPr>
+                <a:t>Kubernetes Event</a:t>
+              </a:r>
+              <a:br>
+                <a:rPr lang="en-US" sz="1400" dirty="0">
+                  <a:solidFill>
+                    <a:srgbClr val="0072C9"/>
+                  </a:solidFill>
+                  <a:latin typeface="Segoe UI Semibold" panose="020B0702040204020203" pitchFamily="34" charset="0"/>
+                  <a:cs typeface="Segoe UI Semibold" panose="020B0702040204020203" pitchFamily="34" charset="0"/>
+                </a:rPr>
+              </a:br>
+              <a:r>
+                <a:rPr lang="en-US" sz="1400" dirty="0">
+                  <a:solidFill>
+                    <a:srgbClr val="0072C9"/>
+                  </a:solidFill>
+                  <a:latin typeface="Segoe UI Semibold" panose="020B0702040204020203" pitchFamily="34" charset="0"/>
+                  <a:cs typeface="Segoe UI Semibold" panose="020B0702040204020203" pitchFamily="34" charset="0"/>
+                </a:rPr>
+                <a:t>Grid Bridge</a:t>
+              </a:r>
+              <a:endParaRPr lang="LID4096" sz="1400" dirty="0">
+                <a:solidFill>
+                  <a:srgbClr val="0072C9"/>
+                </a:solidFill>
+                <a:latin typeface="Segoe UI Semibold" panose="020B0702040204020203" pitchFamily="34" charset="0"/>
+                <a:cs typeface="Segoe UI Semibold" panose="020B0702040204020203" pitchFamily="34" charset="0"/>
+              </a:endParaRPr>
+            </a:p>
+          </p:txBody>
+        </p:sp>
+      </p:grpSp>
+      <p:sp>
+        <p:nvSpPr>
+          <p:cNvPr id="65" name="Rectangle 64">
+            <a:extLst>
+              <a:ext uri="{FF2B5EF4-FFF2-40B4-BE49-F238E27FC236}">
+                <a16:creationId xmlns:a16="http://schemas.microsoft.com/office/drawing/2014/main" id="{C8AA0005-7F0A-49AA-ABD9-02731ACB1B68}"/>
+              </a:ext>
+            </a:extLst>
+          </p:cNvPr>
+          <p:cNvSpPr/>
+          <p:nvPr/>
+        </p:nvSpPr>
+        <p:spPr>
+          <a:xfrm>
+            <a:off x="616597" y="679687"/>
+            <a:ext cx="11029063" cy="1798885"/>
+          </a:xfrm>
+          <a:prstGeom prst="rect">
+            <a:avLst/>
+          </a:prstGeom>
+          <a:solidFill>
+            <a:srgbClr val="FFFFFF"/>
+          </a:solidFill>
+          <a:ln w="25400" cap="flat" cmpd="sng" algn="ctr">
+            <a:solidFill>
+              <a:srgbClr val="0070C0"/>
+            </a:solidFill>
+            <a:prstDash val="solid"/>
+          </a:ln>
+          <a:effectLst/>
+        </p:spPr>
+        <p:txBody>
+          <a:bodyPr rtlCol="0" anchor="ctr"/>
+          <a:lstStyle/>
+          <a:p>
+            <a:pPr marL="0" marR="0" lvl="0" indent="0" algn="ctr" defTabSz="914400" eaLnBrk="1" fontAlgn="auto" latinLnBrk="0" hangingPunct="1">
+              <a:lnSpc>
+                <a:spcPct val="100000"/>
+              </a:lnSpc>
+              <a:spcBef>
+                <a:spcPts val="0"/>
+              </a:spcBef>
+              <a:spcAft>
+                <a:spcPts val="0"/>
+              </a:spcAft>
+              <a:buClrTx/>
+              <a:buSzTx/>
+              <a:buFontTx/>
+              <a:buNone/>
+              <a:tabLst/>
+              <a:defRPr/>
+            </a:pPr>
+            <a:endParaRPr kumimoji="0" lang="en-BE" sz="1800" b="0" i="0" u="none" strike="noStrike" kern="0" cap="none" spc="0" normalizeH="0" baseline="0" noProof="0" dirty="0" err="1">
+              <a:ln>
+                <a:noFill/>
+              </a:ln>
+              <a:solidFill>
+                <a:srgbClr val="FFFFFF"/>
+              </a:solidFill>
+              <a:effectLst/>
+              <a:uLnTx/>
+              <a:uFillTx/>
+              <a:latin typeface="Tahoma"/>
+              <a:ea typeface="+mn-ea"/>
+              <a:cs typeface="Tahoma"/>
+            </a:endParaRPr>
+          </a:p>
+        </p:txBody>
+      </p:sp>
+      <p:pic>
+        <p:nvPicPr>
+          <p:cNvPr id="66" name="Picture 2" descr="Microsoft Azure | Equinix">
+            <a:extLst>
+              <a:ext uri="{FF2B5EF4-FFF2-40B4-BE49-F238E27FC236}">
+                <a16:creationId xmlns:a16="http://schemas.microsoft.com/office/drawing/2014/main" id="{82C66373-0798-4A46-B537-29D31E8C4985}"/>
+              </a:ext>
+            </a:extLst>
+          </p:cNvPr>
+          <p:cNvPicPr>
+            <a:picLocks noChangeAspect="1" noChangeArrowheads="1"/>
+          </p:cNvPicPr>
+          <p:nvPr/>
+        </p:nvPicPr>
+        <p:blipFill>
+          <a:blip r:embed="rId4" cstate="print">
+            <a:extLst>
+              <a:ext uri="{28A0092B-C50C-407E-A947-70E740481C1C}">
+                <a14:useLocalDpi xmlns:a14="http://schemas.microsoft.com/office/drawing/2010/main" val="0"/>
+              </a:ext>
+            </a:extLst>
+          </a:blip>
+          <a:srcRect/>
+          <a:stretch>
+            <a:fillRect/>
+          </a:stretch>
+        </p:blipFill>
+        <p:spPr bwMode="auto">
+          <a:xfrm>
+            <a:off x="616597" y="75716"/>
+            <a:ext cx="2747704" cy="491904"/>
+          </a:xfrm>
+          <a:prstGeom prst="rect">
+            <a:avLst/>
+          </a:prstGeom>
+          <a:noFill/>
+          <a:extLst>
+            <a:ext uri="{909E8E84-426E-40DD-AFC4-6F175D3DCCD1}">
+              <a14:hiddenFill xmlns:a14="http://schemas.microsoft.com/office/drawing/2010/main">
+                <a:solidFill>
+                  <a:srgbClr val="FFFFFF"/>
+                </a:solidFill>
+              </a14:hiddenFill>
+            </a:ext>
+          </a:extLst>
+        </p:spPr>
+      </p:pic>
+      <p:grpSp>
+        <p:nvGrpSpPr>
+          <p:cNvPr id="13" name="Group 12">
+            <a:extLst>
+              <a:ext uri="{FF2B5EF4-FFF2-40B4-BE49-F238E27FC236}">
+                <a16:creationId xmlns:a16="http://schemas.microsoft.com/office/drawing/2014/main" id="{955CA5E0-88EB-457A-9176-8A908C80570F}"/>
+              </a:ext>
+            </a:extLst>
+          </p:cNvPr>
+          <p:cNvGrpSpPr/>
+          <p:nvPr/>
+        </p:nvGrpSpPr>
+        <p:grpSpPr>
+          <a:xfrm>
+            <a:off x="5514663" y="910089"/>
+            <a:ext cx="1506455" cy="1185564"/>
+            <a:chOff x="5514663" y="910089"/>
+            <a:chExt cx="1506455" cy="1185564"/>
+          </a:xfrm>
+        </p:grpSpPr>
+        <p:pic>
+          <p:nvPicPr>
+            <p:cNvPr id="9" name="Picture 8">
+              <a:extLst>
+                <a:ext uri="{FF2B5EF4-FFF2-40B4-BE49-F238E27FC236}">
+                  <a16:creationId xmlns:a16="http://schemas.microsoft.com/office/drawing/2014/main" id="{4C054706-D2D1-42B5-B385-4C72DC18B9BD}"/>
+                </a:ext>
+              </a:extLst>
+            </p:cNvPr>
+            <p:cNvPicPr>
+              <a:picLocks noChangeAspect="1"/>
+            </p:cNvPicPr>
+            <p:nvPr/>
+          </p:nvPicPr>
+          <p:blipFill>
+            <a:blip r:embed="rId5"/>
+            <a:stretch>
+              <a:fillRect/>
+            </a:stretch>
+          </p:blipFill>
+          <p:spPr>
+            <a:xfrm>
+              <a:off x="5838039" y="910089"/>
+              <a:ext cx="868512" cy="866126"/>
+            </a:xfrm>
+            <a:prstGeom prst="rect">
+              <a:avLst/>
+            </a:prstGeom>
+          </p:spPr>
+        </p:pic>
+        <p:sp>
+          <p:nvSpPr>
+            <p:cNvPr id="68" name="TextBox 67">
+              <a:extLst>
+                <a:ext uri="{FF2B5EF4-FFF2-40B4-BE49-F238E27FC236}">
+                  <a16:creationId xmlns:a16="http://schemas.microsoft.com/office/drawing/2014/main" id="{2FCDF0FB-303B-4258-9717-BC68F9DBDDDC}"/>
+                </a:ext>
+              </a:extLst>
+            </p:cNvPr>
+            <p:cNvSpPr txBox="1"/>
+            <p:nvPr/>
+          </p:nvSpPr>
+          <p:spPr>
+            <a:xfrm>
+              <a:off x="5514663" y="1818654"/>
+              <a:ext cx="1506455" cy="276999"/>
+            </a:xfrm>
+            <a:prstGeom prst="rect">
+              <a:avLst/>
+            </a:prstGeom>
+            <a:noFill/>
+          </p:spPr>
+          <p:txBody>
+            <a:bodyPr wrap="square" rtlCol="0">
+              <a:spAutoFit/>
+            </a:bodyPr>
+            <a:lstStyle/>
+            <a:p>
+              <a:pPr algn="ctr"/>
+              <a:r>
+                <a:rPr lang="en-US" sz="1200" dirty="0">
+                  <a:latin typeface="Segoe UI Light" panose="020B0502040204020203" pitchFamily="34" charset="0"/>
+                  <a:cs typeface="Segoe UI Light" panose="020B0502040204020203" pitchFamily="34" charset="0"/>
+                </a:rPr>
+                <a:t>Azure Event Grid</a:t>
+              </a:r>
+              <a:endParaRPr lang="LID4096" sz="1200" dirty="0">
+                <a:latin typeface="Segoe UI Light" panose="020B0502040204020203" pitchFamily="34" charset="0"/>
+                <a:cs typeface="Segoe UI Light" panose="020B0502040204020203" pitchFamily="34" charset="0"/>
+              </a:endParaRPr>
+            </a:p>
+          </p:txBody>
+        </p:sp>
+      </p:grpSp>
+      <p:cxnSp>
+        <p:nvCxnSpPr>
+          <p:cNvPr id="11" name="Connector: Elbow 10">
+            <a:extLst>
+              <a:ext uri="{FF2B5EF4-FFF2-40B4-BE49-F238E27FC236}">
+                <a16:creationId xmlns:a16="http://schemas.microsoft.com/office/drawing/2014/main" id="{FDC84D5E-76A6-4F54-9333-E94A68E41D20}"/>
+              </a:ext>
+            </a:extLst>
+          </p:cNvPr>
+          <p:cNvCxnSpPr>
+            <a:cxnSpLocks/>
+            <a:stCxn id="29" idx="0"/>
+            <a:endCxn id="68" idx="2"/>
+          </p:cNvCxnSpPr>
+          <p:nvPr/>
+        </p:nvCxnSpPr>
+        <p:spPr>
+          <a:xfrm rot="16200000" flipV="1">
+            <a:off x="5223663" y="3139881"/>
+            <a:ext cx="2092860" cy="4404"/>
+          </a:xfrm>
+          <a:prstGeom prst="bentConnector3">
+            <a:avLst>
+              <a:gd name="adj1" fmla="val 50000"/>
+            </a:avLst>
+          </a:prstGeom>
+          <a:ln w="12700">
+            <a:tailEnd type="triangle"/>
+          </a:ln>
+        </p:spPr>
+        <p:style>
+          <a:lnRef idx="1">
+            <a:schemeClr val="accent6"/>
+          </a:lnRef>
+          <a:fillRef idx="0">
+            <a:schemeClr val="accent6"/>
+          </a:fillRef>
+          <a:effectRef idx="0">
+            <a:schemeClr val="accent6"/>
+          </a:effectRef>
+          <a:fontRef idx="minor">
+            <a:schemeClr val="tx1"/>
+          </a:fontRef>
+        </p:style>
+      </p:cxnSp>
+      <p:grpSp>
+        <p:nvGrpSpPr>
+          <p:cNvPr id="7" name="Group 6">
+            <a:extLst>
+              <a:ext uri="{FF2B5EF4-FFF2-40B4-BE49-F238E27FC236}">
+                <a16:creationId xmlns:a16="http://schemas.microsoft.com/office/drawing/2014/main" id="{0282BD41-FA64-4F26-956E-708128BC4FC6}"/>
+              </a:ext>
+            </a:extLst>
+          </p:cNvPr>
+          <p:cNvGrpSpPr/>
+          <p:nvPr/>
+        </p:nvGrpSpPr>
+        <p:grpSpPr>
+          <a:xfrm>
+            <a:off x="1012185" y="4188513"/>
+            <a:ext cx="1730768" cy="2134648"/>
+            <a:chOff x="1012185" y="4188513"/>
+            <a:chExt cx="1730768" cy="2134648"/>
+          </a:xfrm>
+        </p:grpSpPr>
+        <p:grpSp>
+          <p:nvGrpSpPr>
+            <p:cNvPr id="69" name="Group 68">
+              <a:extLst>
+                <a:ext uri="{FF2B5EF4-FFF2-40B4-BE49-F238E27FC236}">
+                  <a16:creationId xmlns:a16="http://schemas.microsoft.com/office/drawing/2014/main" id="{224BB704-F860-4EC2-A0FB-B594FDD60748}"/>
+                </a:ext>
+              </a:extLst>
+            </p:cNvPr>
+            <p:cNvGrpSpPr/>
+            <p:nvPr/>
+          </p:nvGrpSpPr>
+          <p:grpSpPr>
+            <a:xfrm>
+              <a:off x="1012185" y="4188513"/>
+              <a:ext cx="1730768" cy="2134648"/>
+              <a:chOff x="3484518" y="2941384"/>
+              <a:chExt cx="1506455" cy="1872156"/>
+            </a:xfrm>
+          </p:grpSpPr>
+          <p:sp>
+            <p:nvSpPr>
+              <p:cNvPr id="70" name="Rectangle 69">
+                <a:extLst>
+                  <a:ext uri="{FF2B5EF4-FFF2-40B4-BE49-F238E27FC236}">
+                    <a16:creationId xmlns:a16="http://schemas.microsoft.com/office/drawing/2014/main" id="{B21EF173-AE97-4710-B2F4-FC16F06FC642}"/>
+                  </a:ext>
+                </a:extLst>
+              </p:cNvPr>
+              <p:cNvSpPr/>
+              <p:nvPr/>
+            </p:nvSpPr>
+            <p:spPr>
+              <a:xfrm>
+                <a:off x="3484518" y="2941384"/>
+                <a:ext cx="1506455" cy="1872156"/>
+              </a:xfrm>
+              <a:prstGeom prst="rect">
+                <a:avLst/>
+              </a:prstGeom>
+              <a:solidFill>
+                <a:srgbClr val="FFFFFF"/>
+              </a:solidFill>
+              <a:ln w="19050" cap="flat" cmpd="sng" algn="ctr">
+                <a:solidFill>
+                  <a:schemeClr val="tx1"/>
+                </a:solidFill>
+                <a:prstDash val="solid"/>
+              </a:ln>
+              <a:effectLst/>
+            </p:spPr>
+            <p:txBody>
+              <a:bodyPr rtlCol="0" anchor="ctr"/>
+              <a:lstStyle/>
+              <a:p>
+                <a:pPr marL="0" marR="0" lvl="0" indent="0" algn="ctr" defTabSz="914400" eaLnBrk="1" fontAlgn="auto" latinLnBrk="0" hangingPunct="1">
+                  <a:lnSpc>
+                    <a:spcPct val="100000"/>
+                  </a:lnSpc>
+                  <a:spcBef>
+                    <a:spcPts val="0"/>
+                  </a:spcBef>
+                  <a:spcAft>
+                    <a:spcPts val="0"/>
+                  </a:spcAft>
+                  <a:buClrTx/>
+                  <a:buSzTx/>
+                  <a:buFontTx/>
+                  <a:buNone/>
+                  <a:tabLst/>
+                  <a:defRPr/>
+                </a:pPr>
+                <a:endParaRPr kumimoji="0" lang="en-BE" sz="1800" b="0" i="0" u="none" strike="noStrike" kern="0" cap="none" spc="0" normalizeH="0" baseline="0" noProof="0" dirty="0" err="1">
+                  <a:ln>
+                    <a:noFill/>
+                  </a:ln>
+                  <a:solidFill>
+                    <a:srgbClr val="FFFFFF"/>
+                  </a:solidFill>
+                  <a:effectLst/>
+                  <a:uLnTx/>
+                  <a:uFillTx/>
+                  <a:latin typeface="Tahoma"/>
+                  <a:ea typeface="+mn-ea"/>
+                  <a:cs typeface="Tahoma"/>
+                </a:endParaRPr>
+              </a:p>
+            </p:txBody>
+          </p:sp>
+          <p:sp>
+            <p:nvSpPr>
+              <p:cNvPr id="72" name="TextBox 71">
+                <a:extLst>
+                  <a:ext uri="{FF2B5EF4-FFF2-40B4-BE49-F238E27FC236}">
+                    <a16:creationId xmlns:a16="http://schemas.microsoft.com/office/drawing/2014/main" id="{48ABA4A6-E92E-48D8-BB87-6847E5200C0C}"/>
+                  </a:ext>
+                </a:extLst>
+              </p:cNvPr>
+              <p:cNvSpPr txBox="1"/>
+              <p:nvPr/>
+            </p:nvSpPr>
+            <p:spPr>
+              <a:xfrm>
+                <a:off x="3484518" y="4219165"/>
+                <a:ext cx="1506455" cy="461665"/>
+              </a:xfrm>
+              <a:prstGeom prst="rect">
+                <a:avLst/>
+              </a:prstGeom>
+              <a:noFill/>
+            </p:spPr>
+            <p:txBody>
+              <a:bodyPr wrap="square" rtlCol="0">
+                <a:spAutoFit/>
+              </a:bodyPr>
+              <a:lstStyle/>
+              <a:p>
+                <a:pPr algn="ctr"/>
+                <a:r>
+                  <a:rPr lang="en-US" sz="1400" dirty="0">
+                    <a:solidFill>
+                      <a:srgbClr val="0072C9"/>
+                    </a:solidFill>
+                    <a:latin typeface="Segoe UI Semibold" panose="020B0702040204020203" pitchFamily="34" charset="0"/>
+                    <a:cs typeface="Segoe UI Semibold" panose="020B0702040204020203" pitchFamily="34" charset="0"/>
+                  </a:rPr>
+                  <a:t>Kubernetes API</a:t>
+                </a:r>
+                <a:br>
+                  <a:rPr lang="en-US" sz="1400" dirty="0">
+                    <a:solidFill>
+                      <a:srgbClr val="0072C9"/>
+                    </a:solidFill>
+                    <a:latin typeface="Segoe UI Semibold" panose="020B0702040204020203" pitchFamily="34" charset="0"/>
+                    <a:cs typeface="Segoe UI Semibold" panose="020B0702040204020203" pitchFamily="34" charset="0"/>
+                  </a:rPr>
+                </a:br>
+                <a:r>
+                  <a:rPr lang="en-US" sz="1400" dirty="0">
+                    <a:solidFill>
+                      <a:srgbClr val="0072C9"/>
+                    </a:solidFill>
+                    <a:latin typeface="Segoe UI Semibold" panose="020B0702040204020203" pitchFamily="34" charset="0"/>
+                    <a:cs typeface="Segoe UI Semibold" panose="020B0702040204020203" pitchFamily="34" charset="0"/>
+                  </a:rPr>
+                  <a:t>Server</a:t>
+                </a:r>
+                <a:endParaRPr lang="LID4096" sz="1400" dirty="0">
+                  <a:solidFill>
+                    <a:srgbClr val="0072C9"/>
+                  </a:solidFill>
+                  <a:latin typeface="Segoe UI Semibold" panose="020B0702040204020203" pitchFamily="34" charset="0"/>
+                  <a:cs typeface="Segoe UI Semibold" panose="020B0702040204020203" pitchFamily="34" charset="0"/>
+                </a:endParaRPr>
+              </a:p>
+            </p:txBody>
+          </p:sp>
+        </p:grpSp>
+        <p:pic>
+          <p:nvPicPr>
+            <p:cNvPr id="1026" name="Picture 2" descr="Logo Kubernetes PNG transparents - StickPNG">
+              <a:extLst>
+                <a:ext uri="{FF2B5EF4-FFF2-40B4-BE49-F238E27FC236}">
+                  <a16:creationId xmlns:a16="http://schemas.microsoft.com/office/drawing/2014/main" id="{69BE63DB-2135-4A5D-88D4-3ED36E07DB52}"/>
+                </a:ext>
+              </a:extLst>
+            </p:cNvPr>
+            <p:cNvPicPr>
+              <a:picLocks noChangeAspect="1" noChangeArrowheads="1"/>
+            </p:cNvPicPr>
+            <p:nvPr/>
+          </p:nvPicPr>
+          <p:blipFill>
+            <a:blip r:embed="rId6">
+              <a:extLst>
+                <a:ext uri="{28A0092B-C50C-407E-A947-70E740481C1C}">
+                  <a14:useLocalDpi xmlns:a14="http://schemas.microsoft.com/office/drawing/2010/main" val="0"/>
+                </a:ext>
+              </a:extLst>
+            </a:blip>
+            <a:srcRect/>
+            <a:stretch>
+              <a:fillRect/>
+            </a:stretch>
+          </p:blipFill>
+          <p:spPr bwMode="auto">
+            <a:xfrm>
+              <a:off x="1337478" y="4348596"/>
+              <a:ext cx="1080182" cy="1051432"/>
+            </a:xfrm>
+            <a:prstGeom prst="rect">
+              <a:avLst/>
+            </a:prstGeom>
+            <a:noFill/>
+            <a:extLst>
+              <a:ext uri="{909E8E84-426E-40DD-AFC4-6F175D3DCCD1}">
+                <a14:hiddenFill xmlns:a14="http://schemas.microsoft.com/office/drawing/2010/main">
+                  <a:solidFill>
+                    <a:srgbClr val="FFFFFF"/>
+                  </a:solidFill>
+                </a14:hiddenFill>
+              </a:ext>
+            </a:extLst>
+          </p:spPr>
+        </p:pic>
+      </p:grpSp>
+      <p:cxnSp>
+        <p:nvCxnSpPr>
+          <p:cNvPr id="85" name="Connector: Elbow 84">
+            <a:extLst>
+              <a:ext uri="{FF2B5EF4-FFF2-40B4-BE49-F238E27FC236}">
+                <a16:creationId xmlns:a16="http://schemas.microsoft.com/office/drawing/2014/main" id="{3317D6FF-38CA-48E7-A90E-E6695A2FDA81}"/>
+              </a:ext>
+            </a:extLst>
+          </p:cNvPr>
+          <p:cNvCxnSpPr>
+            <a:cxnSpLocks/>
+            <a:stCxn id="70" idx="3"/>
+            <a:endCxn id="29" idx="1"/>
+          </p:cNvCxnSpPr>
+          <p:nvPr/>
+        </p:nvCxnSpPr>
+        <p:spPr>
+          <a:xfrm>
+            <a:off x="2742953" y="5255837"/>
+            <a:ext cx="2663958" cy="12700"/>
+          </a:xfrm>
+          <a:prstGeom prst="bentConnector3">
+            <a:avLst>
+              <a:gd name="adj1" fmla="val 50000"/>
+            </a:avLst>
+          </a:prstGeom>
+          <a:ln w="12700">
+            <a:prstDash val="dash"/>
+            <a:tailEnd type="triangle"/>
+          </a:ln>
+        </p:spPr>
+        <p:style>
+          <a:lnRef idx="1">
+            <a:schemeClr val="accent6"/>
+          </a:lnRef>
+          <a:fillRef idx="0">
+            <a:schemeClr val="accent6"/>
+          </a:fillRef>
+          <a:effectRef idx="0">
+            <a:schemeClr val="accent6"/>
+          </a:effectRef>
+          <a:fontRef idx="minor">
+            <a:schemeClr val="tx1"/>
+          </a:fontRef>
+        </p:style>
+      </p:cxnSp>
+      <p:grpSp>
+        <p:nvGrpSpPr>
+          <p:cNvPr id="24" name="Group 23">
+            <a:extLst>
+              <a:ext uri="{FF2B5EF4-FFF2-40B4-BE49-F238E27FC236}">
+                <a16:creationId xmlns:a16="http://schemas.microsoft.com/office/drawing/2014/main" id="{9B2DD443-B26C-4B29-A5FE-43E202C44920}"/>
+              </a:ext>
+            </a:extLst>
+          </p:cNvPr>
+          <p:cNvGrpSpPr/>
+          <p:nvPr/>
+        </p:nvGrpSpPr>
+        <p:grpSpPr>
+          <a:xfrm>
+            <a:off x="5582931" y="2644885"/>
+            <a:ext cx="1369917" cy="753357"/>
+            <a:chOff x="5582931" y="2644885"/>
+            <a:chExt cx="1369917" cy="753357"/>
+          </a:xfrm>
+        </p:grpSpPr>
+        <p:sp>
+          <p:nvSpPr>
+            <p:cNvPr id="26" name="Rectangle 25">
+              <a:extLst>
+                <a:ext uri="{FF2B5EF4-FFF2-40B4-BE49-F238E27FC236}">
+                  <a16:creationId xmlns:a16="http://schemas.microsoft.com/office/drawing/2014/main" id="{39EA4926-F10A-4A61-8AE9-9974D1F154CF}"/>
+                </a:ext>
+              </a:extLst>
+            </p:cNvPr>
+            <p:cNvSpPr/>
+            <p:nvPr/>
+          </p:nvSpPr>
+          <p:spPr>
+            <a:xfrm>
+              <a:off x="5582931" y="3181548"/>
+              <a:ext cx="1369917" cy="216694"/>
+            </a:xfrm>
+            <a:prstGeom prst="rect">
+              <a:avLst/>
+            </a:prstGeom>
+            <a:solidFill>
+              <a:schemeClr val="bg1"/>
+            </a:solidFill>
+            <a:ln>
+              <a:noFill/>
+            </a:ln>
+          </p:spPr>
+          <p:style>
+            <a:lnRef idx="2">
+              <a:schemeClr val="accent1">
+                <a:shade val="50000"/>
+              </a:schemeClr>
+            </a:lnRef>
+            <a:fillRef idx="1">
+              <a:schemeClr val="accent1"/>
+            </a:fillRef>
+            <a:effectRef idx="0">
+              <a:schemeClr val="accent1"/>
+            </a:effectRef>
+            <a:fontRef idx="minor">
+              <a:schemeClr val="lt1"/>
+            </a:fontRef>
+          </p:style>
+          <p:txBody>
+            <a:bodyPr rtlCol="0" anchor="ctr"/>
+            <a:lstStyle/>
+            <a:p>
+              <a:pPr algn="ctr"/>
+              <a:endParaRPr lang="LID4096"/>
+            </a:p>
+          </p:txBody>
+        </p:sp>
+        <p:sp>
+          <p:nvSpPr>
+            <p:cNvPr id="87" name="Rectangle 86">
+              <a:extLst>
+                <a:ext uri="{FF2B5EF4-FFF2-40B4-BE49-F238E27FC236}">
+                  <a16:creationId xmlns:a16="http://schemas.microsoft.com/office/drawing/2014/main" id="{77A2B80F-E19C-4F8E-AFE6-9B0A84694E09}"/>
+                </a:ext>
+              </a:extLst>
+            </p:cNvPr>
+            <p:cNvSpPr/>
+            <p:nvPr/>
+          </p:nvSpPr>
+          <p:spPr>
+            <a:xfrm>
+              <a:off x="5895401" y="2644885"/>
+              <a:ext cx="737827" cy="536663"/>
+            </a:xfrm>
+            <a:prstGeom prst="rect">
+              <a:avLst/>
+            </a:prstGeom>
+            <a:solidFill>
+              <a:schemeClr val="bg1"/>
+            </a:solidFill>
+            <a:ln>
+              <a:noFill/>
+            </a:ln>
+          </p:spPr>
+          <p:style>
+            <a:lnRef idx="2">
+              <a:schemeClr val="accent1">
+                <a:shade val="50000"/>
+              </a:schemeClr>
+            </a:lnRef>
+            <a:fillRef idx="1">
+              <a:schemeClr val="accent1"/>
+            </a:fillRef>
+            <a:effectRef idx="0">
+              <a:schemeClr val="accent1"/>
+            </a:effectRef>
+            <a:fontRef idx="minor">
+              <a:schemeClr val="lt1"/>
+            </a:fontRef>
+          </p:style>
+          <p:txBody>
+            <a:bodyPr rtlCol="0" anchor="ctr"/>
+            <a:lstStyle/>
+            <a:p>
+              <a:pPr algn="ctr"/>
+              <a:endParaRPr lang="LID4096"/>
+            </a:p>
+          </p:txBody>
+        </p:sp>
+        <p:pic>
+          <p:nvPicPr>
+            <p:cNvPr id="1028" name="Picture 4">
+              <a:extLst>
+                <a:ext uri="{FF2B5EF4-FFF2-40B4-BE49-F238E27FC236}">
+                  <a16:creationId xmlns:a16="http://schemas.microsoft.com/office/drawing/2014/main" id="{EAE24AD2-27F6-43E2-9E65-60EFA4D58264}"/>
+                </a:ext>
+              </a:extLst>
+            </p:cNvPr>
+            <p:cNvPicPr>
+              <a:picLocks noChangeAspect="1" noChangeArrowheads="1"/>
+            </p:cNvPicPr>
+            <p:nvPr/>
+          </p:nvPicPr>
+          <p:blipFill>
+            <a:blip r:embed="rId7">
+              <a:extLst>
+                <a:ext uri="{28A0092B-C50C-407E-A947-70E740481C1C}">
+                  <a14:useLocalDpi xmlns:a14="http://schemas.microsoft.com/office/drawing/2010/main" val="0"/>
+                </a:ext>
+              </a:extLst>
+            </a:blip>
+            <a:srcRect/>
+            <a:stretch>
+              <a:fillRect/>
+            </a:stretch>
+          </p:blipFill>
+          <p:spPr bwMode="auto">
+            <a:xfrm>
+              <a:off x="5685737" y="2702707"/>
+              <a:ext cx="1163736" cy="632298"/>
+            </a:xfrm>
+            <a:prstGeom prst="rect">
+              <a:avLst/>
+            </a:prstGeom>
+            <a:noFill/>
+            <a:extLst>
+              <a:ext uri="{909E8E84-426E-40DD-AFC4-6F175D3DCCD1}">
+                <a14:hiddenFill xmlns:a14="http://schemas.microsoft.com/office/drawing/2010/main">
+                  <a:solidFill>
+                    <a:srgbClr val="FFFFFF"/>
+                  </a:solidFill>
+                </a14:hiddenFill>
+              </a:ext>
+            </a:extLst>
+          </p:spPr>
+        </p:pic>
+      </p:grpSp>
+      <p:grpSp>
+        <p:nvGrpSpPr>
+          <p:cNvPr id="4" name="Group 3">
+            <a:extLst>
+              <a:ext uri="{FF2B5EF4-FFF2-40B4-BE49-F238E27FC236}">
+                <a16:creationId xmlns:a16="http://schemas.microsoft.com/office/drawing/2014/main" id="{D4F9731F-8EA6-4BE5-A4F4-582AF29B0882}"/>
+              </a:ext>
+            </a:extLst>
+          </p:cNvPr>
+          <p:cNvGrpSpPr/>
+          <p:nvPr/>
+        </p:nvGrpSpPr>
+        <p:grpSpPr>
+          <a:xfrm>
+            <a:off x="3223227" y="4188512"/>
+            <a:ext cx="1730768" cy="2134649"/>
+            <a:chOff x="3223227" y="4188512"/>
+            <a:chExt cx="1730768" cy="2134649"/>
+          </a:xfrm>
+        </p:grpSpPr>
+        <p:sp>
+          <p:nvSpPr>
+            <p:cNvPr id="84" name="Rectangle 83">
+              <a:extLst>
+                <a:ext uri="{FF2B5EF4-FFF2-40B4-BE49-F238E27FC236}">
+                  <a16:creationId xmlns:a16="http://schemas.microsoft.com/office/drawing/2014/main" id="{8E06E0C0-F89F-4701-822C-3A562CE74E19}"/>
+                </a:ext>
+              </a:extLst>
+            </p:cNvPr>
+            <p:cNvSpPr/>
+            <p:nvPr/>
+          </p:nvSpPr>
+          <p:spPr>
+            <a:xfrm>
+              <a:off x="3223227" y="4188512"/>
+              <a:ext cx="1730768" cy="2134649"/>
+            </a:xfrm>
+            <a:prstGeom prst="rect">
+              <a:avLst/>
+            </a:prstGeom>
+            <a:solidFill>
+              <a:srgbClr val="FFFFFF"/>
+            </a:solidFill>
+            <a:ln w="19050" cap="flat" cmpd="sng" algn="ctr">
+              <a:solidFill>
+                <a:schemeClr val="tx1"/>
+              </a:solidFill>
+              <a:prstDash val="solid"/>
+            </a:ln>
+            <a:effectLst/>
+          </p:spPr>
+          <p:txBody>
+            <a:bodyPr rtlCol="0" anchor="ctr"/>
+            <a:lstStyle/>
+            <a:p>
+              <a:pPr marR="0" lvl="0" indent="0" algn="ctr" fontAlgn="auto">
+                <a:lnSpc>
+                  <a:spcPct val="100000"/>
+                </a:lnSpc>
+                <a:spcBef>
+                  <a:spcPts val="0"/>
+                </a:spcBef>
+                <a:spcAft>
+                  <a:spcPts val="0"/>
+                </a:spcAft>
+                <a:buClrTx/>
+                <a:buSzTx/>
+                <a:buFontTx/>
+                <a:buNone/>
+                <a:tabLst/>
+                <a:defRPr/>
+              </a:pPr>
+              <a:endParaRPr lang="en-US" sz="1000" dirty="0">
+                <a:solidFill>
+                  <a:srgbClr val="0072C9"/>
+                </a:solidFill>
+                <a:latin typeface="Segoe UI" panose="020B0502040204020203" pitchFamily="34" charset="0"/>
+                <a:cs typeface="Segoe UI" panose="020B0502040204020203" pitchFamily="34" charset="0"/>
+              </a:endParaRPr>
+            </a:p>
+            <a:p>
+              <a:pPr marR="0" lvl="0" indent="0" algn="ctr" fontAlgn="auto">
+                <a:lnSpc>
+                  <a:spcPct val="100000"/>
+                </a:lnSpc>
+                <a:spcBef>
+                  <a:spcPts val="0"/>
+                </a:spcBef>
+                <a:spcAft>
+                  <a:spcPts val="0"/>
+                </a:spcAft>
+                <a:buClrTx/>
+                <a:buSzTx/>
+                <a:buFontTx/>
+                <a:buNone/>
+                <a:tabLst/>
+                <a:defRPr/>
+              </a:pPr>
+              <a:endParaRPr lang="en-US" sz="1000" dirty="0">
+                <a:solidFill>
+                  <a:srgbClr val="0072C9"/>
+                </a:solidFill>
+                <a:latin typeface="Segoe UI" panose="020B0502040204020203" pitchFamily="34" charset="0"/>
+                <a:cs typeface="Segoe UI" panose="020B0502040204020203" pitchFamily="34" charset="0"/>
+              </a:endParaRPr>
+            </a:p>
+            <a:p>
+              <a:pPr marR="0" lvl="0" indent="0" algn="ctr" fontAlgn="auto">
+                <a:lnSpc>
+                  <a:spcPct val="100000"/>
+                </a:lnSpc>
+                <a:spcBef>
+                  <a:spcPts val="0"/>
+                </a:spcBef>
+                <a:spcAft>
+                  <a:spcPts val="0"/>
+                </a:spcAft>
+                <a:buClrTx/>
+                <a:buSzTx/>
+                <a:buFontTx/>
+                <a:buNone/>
+                <a:tabLst/>
+                <a:defRPr/>
+              </a:pPr>
+              <a:endParaRPr lang="en-US" sz="1000" dirty="0">
+                <a:solidFill>
+                  <a:srgbClr val="0072C9"/>
+                </a:solidFill>
+                <a:latin typeface="Segoe UI" panose="020B0502040204020203" pitchFamily="34" charset="0"/>
+                <a:cs typeface="Segoe UI" panose="020B0502040204020203" pitchFamily="34" charset="0"/>
+              </a:endParaRPr>
+            </a:p>
+            <a:p>
+              <a:pPr marR="0" lvl="0" indent="0" algn="ctr" fontAlgn="auto">
+                <a:lnSpc>
+                  <a:spcPct val="100000"/>
+                </a:lnSpc>
+                <a:spcBef>
+                  <a:spcPts val="0"/>
+                </a:spcBef>
+                <a:spcAft>
+                  <a:spcPts val="0"/>
+                </a:spcAft>
+                <a:buClrTx/>
+                <a:buSzTx/>
+                <a:buFontTx/>
+                <a:buNone/>
+                <a:tabLst/>
+                <a:defRPr/>
+              </a:pPr>
+              <a:endParaRPr lang="en-US" sz="1000" dirty="0">
+                <a:solidFill>
+                  <a:srgbClr val="0072C9"/>
+                </a:solidFill>
+                <a:latin typeface="Segoe UI" panose="020B0502040204020203" pitchFamily="34" charset="0"/>
+                <a:cs typeface="Segoe UI" panose="020B0502040204020203" pitchFamily="34" charset="0"/>
+              </a:endParaRPr>
+            </a:p>
+            <a:p>
+              <a:pPr marR="0" lvl="0" indent="0" algn="ctr" fontAlgn="auto">
+                <a:lnSpc>
+                  <a:spcPct val="100000"/>
+                </a:lnSpc>
+                <a:spcBef>
+                  <a:spcPts val="0"/>
+                </a:spcBef>
+                <a:spcAft>
+                  <a:spcPts val="0"/>
+                </a:spcAft>
+                <a:buClrTx/>
+                <a:buSzTx/>
+                <a:buFontTx/>
+                <a:buNone/>
+                <a:tabLst/>
+                <a:defRPr/>
+              </a:pPr>
+              <a:endParaRPr lang="en-US" sz="1000" dirty="0">
+                <a:solidFill>
+                  <a:srgbClr val="0072C9"/>
+                </a:solidFill>
+                <a:latin typeface="Segoe UI" panose="020B0502040204020203" pitchFamily="34" charset="0"/>
+                <a:cs typeface="Segoe UI" panose="020B0502040204020203" pitchFamily="34" charset="0"/>
+              </a:endParaRPr>
+            </a:p>
+            <a:p>
+              <a:pPr marR="0" lvl="0" indent="0" algn="ctr" fontAlgn="auto">
+                <a:lnSpc>
+                  <a:spcPct val="100000"/>
+                </a:lnSpc>
+                <a:spcBef>
+                  <a:spcPts val="0"/>
+                </a:spcBef>
+                <a:spcAft>
+                  <a:spcPts val="0"/>
+                </a:spcAft>
+                <a:buClrTx/>
+                <a:buSzTx/>
+                <a:buFontTx/>
+                <a:buNone/>
+                <a:tabLst/>
+                <a:defRPr/>
+              </a:pPr>
+              <a:endParaRPr lang="en-US" sz="1000" dirty="0">
+                <a:solidFill>
+                  <a:srgbClr val="0072C9"/>
+                </a:solidFill>
+                <a:latin typeface="Segoe UI" panose="020B0502040204020203" pitchFamily="34" charset="0"/>
+                <a:cs typeface="Segoe UI" panose="020B0502040204020203" pitchFamily="34" charset="0"/>
+              </a:endParaRPr>
+            </a:p>
+            <a:p>
+              <a:pPr marR="0" lvl="0" indent="0" algn="ctr" fontAlgn="auto">
+                <a:lnSpc>
+                  <a:spcPct val="100000"/>
+                </a:lnSpc>
+                <a:spcBef>
+                  <a:spcPts val="0"/>
+                </a:spcBef>
+                <a:spcAft>
+                  <a:spcPts val="0"/>
+                </a:spcAft>
+                <a:buClrTx/>
+                <a:buSzTx/>
+                <a:buFontTx/>
+                <a:buNone/>
+                <a:tabLst/>
+                <a:defRPr/>
+              </a:pPr>
+              <a:endParaRPr lang="en-US" sz="1000" dirty="0">
+                <a:solidFill>
+                  <a:srgbClr val="0072C9"/>
+                </a:solidFill>
+                <a:latin typeface="Segoe UI" panose="020B0502040204020203" pitchFamily="34" charset="0"/>
+                <a:cs typeface="Segoe UI" panose="020B0502040204020203" pitchFamily="34" charset="0"/>
+              </a:endParaRPr>
+            </a:p>
+            <a:p>
+              <a:pPr marR="0" lvl="0" indent="0" algn="ctr" fontAlgn="auto">
+                <a:lnSpc>
+                  <a:spcPct val="100000"/>
+                </a:lnSpc>
+                <a:spcBef>
+                  <a:spcPts val="0"/>
+                </a:spcBef>
+                <a:spcAft>
+                  <a:spcPts val="0"/>
+                </a:spcAft>
+                <a:buClrTx/>
+                <a:buSzTx/>
+                <a:buFontTx/>
+                <a:buNone/>
+                <a:tabLst/>
+                <a:defRPr/>
+              </a:pPr>
+              <a:r>
+                <a:rPr lang="en-US" sz="1000" dirty="0">
+                  <a:solidFill>
+                    <a:srgbClr val="0072C9"/>
+                  </a:solidFill>
+                  <a:latin typeface="Segoe UI" panose="020B0502040204020203" pitchFamily="34" charset="0"/>
+                  <a:cs typeface="Segoe UI" panose="020B0502040204020203" pitchFamily="34" charset="0"/>
+                </a:rPr>
+                <a:t>E.g. </a:t>
+              </a:r>
+              <a:r>
+                <a:rPr lang="en-US" sz="1000" dirty="0" err="1">
+                  <a:solidFill>
+                    <a:srgbClr val="0072C9"/>
+                  </a:solidFill>
+                  <a:latin typeface="Segoe UI" panose="020B0502040204020203" pitchFamily="34" charset="0"/>
+                  <a:cs typeface="Segoe UI" panose="020B0502040204020203" pitchFamily="34" charset="0"/>
+                </a:rPr>
+                <a:t>Opsgenie’s</a:t>
+              </a:r>
+              <a:r>
+                <a:rPr lang="en-US" sz="1000" dirty="0">
+                  <a:solidFill>
+                    <a:srgbClr val="0072C9"/>
+                  </a:solidFill>
+                  <a:latin typeface="Segoe UI" panose="020B0502040204020203" pitchFamily="34" charset="0"/>
+                  <a:cs typeface="Segoe UI" panose="020B0502040204020203" pitchFamily="34" charset="0"/>
+                </a:rPr>
+                <a:t> Kubernetes Event Exporter</a:t>
+              </a:r>
+              <a:br>
+                <a:rPr lang="en-US" sz="1000" dirty="0">
+                  <a:solidFill>
+                    <a:srgbClr val="0072C9"/>
+                  </a:solidFill>
+                  <a:latin typeface="Segoe UI" panose="020B0502040204020203" pitchFamily="34" charset="0"/>
+                  <a:cs typeface="Segoe UI" panose="020B0502040204020203" pitchFamily="34" charset="0"/>
+                </a:rPr>
+              </a:br>
+              <a:endParaRPr lang="en-US" sz="700" dirty="0">
+                <a:solidFill>
+                  <a:srgbClr val="0072C9"/>
+                </a:solidFill>
+                <a:latin typeface="Segoe UI" panose="020B0502040204020203" pitchFamily="34" charset="0"/>
+                <a:cs typeface="Segoe UI" panose="020B0502040204020203" pitchFamily="34" charset="0"/>
+              </a:endParaRPr>
+            </a:p>
+            <a:p>
+              <a:pPr algn="ctr">
+                <a:defRPr/>
+              </a:pPr>
+              <a:r>
+                <a:rPr lang="en-US" sz="1400" dirty="0">
+                  <a:solidFill>
+                    <a:srgbClr val="0072C9"/>
+                  </a:solidFill>
+                  <a:latin typeface="Segoe UI Semibold" panose="020B0702040204020203" pitchFamily="34" charset="0"/>
+                  <a:cs typeface="Segoe UI Semibold" panose="020B0702040204020203" pitchFamily="34" charset="0"/>
+                </a:rPr>
+                <a:t>Event Exporter</a:t>
+              </a:r>
+              <a:br>
+                <a:rPr lang="en-US" sz="1200" dirty="0">
+                  <a:solidFill>
+                    <a:srgbClr val="0072C9"/>
+                  </a:solidFill>
+                  <a:latin typeface="Segoe UI Semibold" panose="020B0702040204020203" pitchFamily="34" charset="0"/>
+                  <a:cs typeface="Segoe UI Semibold" panose="020B0702040204020203" pitchFamily="34" charset="0"/>
+                </a:rPr>
+              </a:br>
+              <a:endParaRPr lang="en-BE" sz="1000" dirty="0" err="1">
+                <a:solidFill>
+                  <a:srgbClr val="0072C9"/>
+                </a:solidFill>
+                <a:latin typeface="Segoe UI Semibold" panose="020B0702040204020203" pitchFamily="34" charset="0"/>
+                <a:cs typeface="Segoe UI Semibold" panose="020B0702040204020203" pitchFamily="34" charset="0"/>
+              </a:endParaRPr>
+            </a:p>
+          </p:txBody>
+        </p:sp>
+        <p:pic>
+          <p:nvPicPr>
+            <p:cNvPr id="2052" name="Picture 4" descr="@opsgenie">
+              <a:extLst>
+                <a:ext uri="{FF2B5EF4-FFF2-40B4-BE49-F238E27FC236}">
+                  <a16:creationId xmlns:a16="http://schemas.microsoft.com/office/drawing/2014/main" id="{18E1D23B-BDE4-48F6-B5AD-C8D255344C28}"/>
+                </a:ext>
+              </a:extLst>
+            </p:cNvPr>
+            <p:cNvPicPr>
+              <a:picLocks noChangeAspect="1" noChangeArrowheads="1"/>
+            </p:cNvPicPr>
+            <p:nvPr/>
+          </p:nvPicPr>
+          <p:blipFill>
+            <a:blip r:embed="rId8">
+              <a:extLst>
+                <a:ext uri="{28A0092B-C50C-407E-A947-70E740481C1C}">
+                  <a14:useLocalDpi xmlns:a14="http://schemas.microsoft.com/office/drawing/2010/main" val="0"/>
+                </a:ext>
+              </a:extLst>
+            </a:blip>
+            <a:srcRect/>
+            <a:stretch>
+              <a:fillRect/>
+            </a:stretch>
+          </p:blipFill>
+          <p:spPr bwMode="auto">
+            <a:xfrm>
+              <a:off x="3528026" y="4273313"/>
+              <a:ext cx="1126715" cy="1126715"/>
+            </a:xfrm>
+            <a:prstGeom prst="rect">
+              <a:avLst/>
+            </a:prstGeom>
+            <a:noFill/>
+            <a:extLst>
+              <a:ext uri="{909E8E84-426E-40DD-AFC4-6F175D3DCCD1}">
+                <a14:hiddenFill xmlns:a14="http://schemas.microsoft.com/office/drawing/2010/main">
+                  <a:solidFill>
+                    <a:srgbClr val="FFFFFF"/>
+                  </a:solidFill>
+                </a14:hiddenFill>
+              </a:ext>
+            </a:extLst>
+          </p:spPr>
+        </p:pic>
+      </p:grpSp>
       <p:cxnSp>
         <p:nvCxnSpPr>
           <p:cNvPr id="28" name="Connector: Elbow 27">
@@ -9123,7 +10705,7 @@
     </p:spTree>
     <p:extLst>
       <p:ext uri="{BB962C8B-B14F-4D97-AF65-F5344CB8AC3E}">
-        <p14:creationId xmlns:p14="http://schemas.microsoft.com/office/powerpoint/2010/main" val="2013672162"/>
+        <p14:creationId xmlns:p14="http://schemas.microsoft.com/office/powerpoint/2010/main" val="4163686807"/>
       </p:ext>
     </p:extLst>
   </p:cSld>

</xml_diff>